<commit_message>
another minor changes to pptx
</commit_message>
<xml_diff>
--- a/ApplicantVisitDay.pptx
+++ b/ApplicantVisitDay.pptx
@@ -7795,7 +7795,7 @@
             </a:pPr>
             <a:r>
               <a:rPr lang="en-GB" dirty="0"/>
-              <a:t>Select the "</a:t>
+              <a:t>Double-click the "</a:t>
             </a:r>
             <a:r>
               <a:rPr lang="en-GB" dirty="0">
@@ -7803,7 +7803,7 @@
                   <a:srgbClr val="FFA43D"/>
                 </a:solidFill>
               </a:rPr>
-              <a:t>Documents</a:t>
+              <a:t>Downloads</a:t>
             </a:r>
             <a:r>
               <a:rPr lang="en-GB" dirty="0"/>
@@ -7957,7 +7957,7 @@
           </p:nvSpPr>
           <p:spPr>
             <a:xfrm>
-              <a:off x="5988121" y="4282440"/>
+              <a:off x="5988121" y="4419600"/>
               <a:ext cx="288000" cy="252000"/>
             </a:xfrm>
             <a:prstGeom prst="rightArrow">
@@ -9421,12 +9421,20 @@
             </a:pPr>
             <a:r>
               <a:rPr lang="en-GB" dirty="0"/>
-              <a:t>Click the file ‘’</a:t>
+              <a:t>Click the file ‘</a:t>
+            </a:r>
+            <a:r>
+              <a:rPr lang="en-GB" dirty="0">
+                <a:solidFill>
+                  <a:srgbClr val="FFA43D"/>
+                </a:solidFill>
+              </a:rPr>
+              <a:t>’</a:t>
             </a:r>
             <a:r>
               <a:rPr lang="en-GB" dirty="0" err="1">
                 <a:solidFill>
-                  <a:srgbClr val="FFC000"/>
+                  <a:srgbClr val="FFA43D"/>
                 </a:solidFill>
               </a:rPr>
               <a:t>ApplicantVisitDay.ipynb</a:t>
@@ -9448,7 +9456,7 @@
             <a:r>
               <a:rPr lang="en-GB" dirty="0">
                 <a:solidFill>
-                  <a:srgbClr val="FFC000"/>
+                  <a:srgbClr val="FFA43D"/>
                 </a:solidFill>
               </a:rPr>
               <a:t>’Download raw file</a:t>
@@ -9467,7 +9475,7 @@
             <a:r>
               <a:rPr lang="en-GB" sz="2800" dirty="0">
                 <a:solidFill>
-                  <a:srgbClr val="FFC000"/>
+                  <a:srgbClr val="FFA43D"/>
                 </a:solidFill>
               </a:rPr>
               <a:t>Downloads</a:t>
@@ -9927,7 +9935,7 @@
             </a:pPr>
             <a:r>
               <a:rPr lang="en-GB" dirty="0"/>
-              <a:t>Select the "</a:t>
+              <a:t>Double-click the "</a:t>
             </a:r>
             <a:r>
               <a:rPr lang="en-GB" dirty="0">
@@ -9935,7 +9943,7 @@
                   <a:srgbClr val="FFA43D"/>
                 </a:solidFill>
               </a:rPr>
-              <a:t>Documents</a:t>
+              <a:t>Downloads</a:t>
             </a:r>
             <a:r>
               <a:rPr lang="en-GB" dirty="0"/>
@@ -9946,7 +9954,7 @@
             <a:pPr lvl="1"/>
             <a:r>
               <a:rPr lang="en-GB" sz="2000" dirty="0"/>
-              <a:t>This is where you will create the notebook</a:t>
+              <a:t>This is where you will upload the notebook</a:t>
             </a:r>
             <a:r>
               <a:rPr lang="en-GB" dirty="0"/>
@@ -9988,7 +9996,7 @@
             <a:r>
               <a:rPr lang="en-GB" sz="2600" dirty="0">
                 <a:solidFill>
-                  <a:srgbClr val="FFC000"/>
+                  <a:schemeClr val="bg1"/>
                 </a:solidFill>
               </a:rPr>
               <a:t>’</a:t>
@@ -10030,7 +10038,7 @@
                   <a:srgbClr val="FFA43D"/>
                 </a:solidFill>
               </a:rPr>
-              <a:t>Documents</a:t>
+              <a:t>Downloads</a:t>
             </a:r>
             <a:r>
               <a:rPr lang="en-GB" sz="2000" dirty="0"/>
@@ -10044,17 +10052,17 @@
             </a:pPr>
             <a:r>
               <a:rPr lang="en-GB" sz="2600" dirty="0"/>
-              <a:t>Click the file to open</a:t>
+              <a:t>Double-click the file to open</a:t>
             </a:r>
           </a:p>
         </p:txBody>
       </p:sp>
       <p:grpSp>
         <p:nvGrpSpPr>
-          <p:cNvPr id="17" name="Group 16">
+          <p:cNvPr id="23" name="Group 22">
             <a:extLst>
               <a:ext uri="{FF2B5EF4-FFF2-40B4-BE49-F238E27FC236}">
-                <a16:creationId xmlns:a16="http://schemas.microsoft.com/office/drawing/2014/main" id="{B69A3979-D1F6-4FF6-41B6-0A15AF66DC67}"/>
+                <a16:creationId xmlns:a16="http://schemas.microsoft.com/office/drawing/2014/main" id="{601CF6A9-189C-6FB4-BC52-DBA30F84639D}"/>
               </a:ext>
             </a:extLst>
           </p:cNvPr>
@@ -10063,18 +10071,18 @@
         </p:nvGrpSpPr>
         <p:grpSpPr>
           <a:xfrm>
-            <a:off x="6321720" y="1690688"/>
-            <a:ext cx="5762970" cy="4326912"/>
-            <a:chOff x="6276000" y="1470157"/>
-            <a:chExt cx="5762970" cy="4326912"/>
+            <a:off x="6096952" y="1681625"/>
+            <a:ext cx="5938293" cy="4938249"/>
+            <a:chOff x="6096952" y="1681625"/>
+            <a:chExt cx="5938293" cy="4938249"/>
           </a:xfrm>
         </p:grpSpPr>
         <p:pic>
           <p:nvPicPr>
-            <p:cNvPr id="5" name="Picture 4">
+            <p:cNvPr id="7" name="Picture 6">
               <a:extLst>
                 <a:ext uri="{FF2B5EF4-FFF2-40B4-BE49-F238E27FC236}">
-                  <a16:creationId xmlns:a16="http://schemas.microsoft.com/office/drawing/2014/main" id="{4F9078DC-771F-3EEE-A639-51130A7E94A2}"/>
+                  <a16:creationId xmlns:a16="http://schemas.microsoft.com/office/drawing/2014/main" id="{CEC28728-65F9-C3A3-3288-C437B75AC2A7}"/>
                 </a:ext>
               </a:extLst>
             </p:cNvPr>
@@ -10091,8 +10099,8 @@
           </p:blipFill>
           <p:spPr>
             <a:xfrm>
-              <a:off x="6276000" y="1690688"/>
-              <a:ext cx="4860000" cy="2847352"/>
+              <a:off x="6096952" y="1825625"/>
+              <a:ext cx="4752975" cy="3019425"/>
             </a:xfrm>
             <a:prstGeom prst="rect">
               <a:avLst/>
@@ -10101,10 +10109,10 @@
         </p:pic>
         <p:pic>
           <p:nvPicPr>
-            <p:cNvPr id="12" name="Picture 11">
+            <p:cNvPr id="11" name="Picture 10" descr="A screenshot of a computer&#10;&#10;AI-generated content may be incorrect.">
               <a:extLst>
                 <a:ext uri="{FF2B5EF4-FFF2-40B4-BE49-F238E27FC236}">
-                  <a16:creationId xmlns:a16="http://schemas.microsoft.com/office/drawing/2014/main" id="{EBF04A2F-33FD-371B-03EB-21B2B4372A91}"/>
+                  <a16:creationId xmlns:a16="http://schemas.microsoft.com/office/drawing/2014/main" id="{CC684B7F-1DEC-186C-5DC1-D4CAEF70A1BE}"/>
                 </a:ext>
               </a:extLst>
             </p:cNvPr>
@@ -10114,15 +10122,21 @@
             <p:nvPr/>
           </p:nvPicPr>
           <p:blipFill>
-            <a:blip r:embed="rId4"/>
+            <a:blip r:embed="rId4">
+              <a:extLst>
+                <a:ext uri="{28A0092B-C50C-407E-A947-70E740481C1C}">
+                  <a14:useLocalDpi xmlns:a14="http://schemas.microsoft.com/office/drawing/2010/main" val="0"/>
+                </a:ext>
+              </a:extLst>
+            </a:blip>
             <a:stretch>
               <a:fillRect/>
             </a:stretch>
           </p:blipFill>
           <p:spPr>
             <a:xfrm>
-              <a:off x="7178970" y="2638069"/>
-              <a:ext cx="4860000" cy="3159000"/>
+              <a:off x="7290434" y="3600449"/>
+              <a:ext cx="4744811" cy="3019425"/>
             </a:xfrm>
             <a:prstGeom prst="rect">
               <a:avLst/>
@@ -10131,66 +10145,10 @@
         </p:pic>
         <p:sp>
           <p:nvSpPr>
-            <p:cNvPr id="13" name="Oval 12">
+            <p:cNvPr id="18" name="Arrow: Right 17">
               <a:extLst>
                 <a:ext uri="{FF2B5EF4-FFF2-40B4-BE49-F238E27FC236}">
-                  <a16:creationId xmlns:a16="http://schemas.microsoft.com/office/drawing/2014/main" id="{269B8491-87FB-06AF-DAC8-A87908C75BFF}"/>
-                </a:ext>
-              </a:extLst>
-            </p:cNvPr>
-            <p:cNvSpPr/>
-            <p:nvPr/>
-          </p:nvSpPr>
-          <p:spPr>
-            <a:xfrm>
-              <a:off x="7248405" y="4320540"/>
-              <a:ext cx="811530" cy="217500"/>
-            </a:xfrm>
-            <a:prstGeom prst="ellipse">
-              <a:avLst/>
-            </a:prstGeom>
-            <a:solidFill>
-              <a:srgbClr val="FFA43D">
-                <a:alpha val="50000"/>
-              </a:srgbClr>
-            </a:solidFill>
-            <a:ln>
-              <a:solidFill>
-                <a:srgbClr val="FF0000"/>
-              </a:solidFill>
-            </a:ln>
-          </p:spPr>
-          <p:style>
-            <a:lnRef idx="2">
-              <a:schemeClr val="accent1">
-                <a:shade val="15000"/>
-              </a:schemeClr>
-            </a:lnRef>
-            <a:fillRef idx="1">
-              <a:schemeClr val="accent1"/>
-            </a:fillRef>
-            <a:effectRef idx="0">
-              <a:schemeClr val="accent1"/>
-            </a:effectRef>
-            <a:fontRef idx="minor">
-              <a:schemeClr val="lt1"/>
-            </a:fontRef>
-          </p:style>
-          <p:txBody>
-            <a:bodyPr rtlCol="0" anchor="ctr"/>
-            <a:lstStyle/>
-            <a:p>
-              <a:pPr algn="ctr"/>
-              <a:endParaRPr lang="en-GB" dirty="0"/>
-            </a:p>
-          </p:txBody>
-        </p:sp>
-        <p:sp>
-          <p:nvSpPr>
-            <p:cNvPr id="14" name="Arrow: Right 13">
-              <a:extLst>
-                <a:ext uri="{FF2B5EF4-FFF2-40B4-BE49-F238E27FC236}">
-                  <a16:creationId xmlns:a16="http://schemas.microsoft.com/office/drawing/2014/main" id="{2A1CDD68-1F53-0ED5-0C6F-9D6AFE9ABEDC}"/>
+                  <a16:creationId xmlns:a16="http://schemas.microsoft.com/office/drawing/2014/main" id="{8D7D73AB-18E4-DF87-D2DB-E037EECA120E}"/>
                 </a:ext>
               </a:extLst>
             </p:cNvPr>
@@ -10199,7 +10157,7 @@
           </p:nvSpPr>
           <p:spPr>
             <a:xfrm rot="5400000">
-              <a:off x="7382655" y="1488157"/>
+              <a:off x="11335800" y="4673330"/>
               <a:ext cx="288000" cy="252000"/>
             </a:xfrm>
             <a:prstGeom prst="rightArrow">
@@ -10239,10 +10197,10 @@
         </p:sp>
         <p:sp>
           <p:nvSpPr>
-            <p:cNvPr id="4" name="Arrow: Right 3">
+            <p:cNvPr id="19" name="Arrow: Right 18">
               <a:extLst>
                 <a:ext uri="{FF2B5EF4-FFF2-40B4-BE49-F238E27FC236}">
-                  <a16:creationId xmlns:a16="http://schemas.microsoft.com/office/drawing/2014/main" id="{A2EEAFA5-E9AC-BEB3-87DD-C32E0D1FC89C}"/>
+                  <a16:creationId xmlns:a16="http://schemas.microsoft.com/office/drawing/2014/main" id="{AB588E59-B495-762B-D93D-59D1A43551E6}"/>
                 </a:ext>
               </a:extLst>
             </p:cNvPr>
@@ -10250,8 +10208,8 @@
             <p:nvPr/>
           </p:nvSpPr>
           <p:spPr>
-            <a:xfrm rot="16200000">
-              <a:off x="6703155" y="4464771"/>
+            <a:xfrm rot="5400000">
+              <a:off x="7630305" y="1699625"/>
               <a:ext cx="288000" cy="252000"/>
             </a:xfrm>
             <a:prstGeom prst="rightArrow">
@@ -10291,10 +10249,10 @@
         </p:sp>
         <p:sp>
           <p:nvSpPr>
-            <p:cNvPr id="15" name="Arrow: Right 14">
+            <p:cNvPr id="20" name="Rectangle: Rounded Corners 19">
               <a:extLst>
                 <a:ext uri="{FF2B5EF4-FFF2-40B4-BE49-F238E27FC236}">
-                  <a16:creationId xmlns:a16="http://schemas.microsoft.com/office/drawing/2014/main" id="{202CED63-3919-0A67-540A-2D03F58E91B6}"/>
+                  <a16:creationId xmlns:a16="http://schemas.microsoft.com/office/drawing/2014/main" id="{6D3CB145-5C1D-EE40-9C60-D59C9E25830B}"/>
                 </a:ext>
               </a:extLst>
             </p:cNvPr>
@@ -10302,15 +10260,17 @@
             <p:nvPr/>
           </p:nvSpPr>
           <p:spPr>
-            <a:xfrm rot="5239676">
-              <a:off x="11389798" y="3875293"/>
-              <a:ext cx="288000" cy="252000"/>
+            <a:xfrm flipV="1">
+              <a:off x="7372350" y="5175250"/>
+              <a:ext cx="803910" cy="219710"/>
             </a:xfrm>
-            <a:prstGeom prst="rightArrow">
+            <a:prstGeom prst="roundRect">
               <a:avLst/>
             </a:prstGeom>
             <a:solidFill>
-              <a:srgbClr val="FFA43D"/>
+              <a:srgbClr val="FFA43D">
+                <a:alpha val="50000"/>
+              </a:srgbClr>
             </a:solidFill>
             <a:ln>
               <a:noFill/>
@@ -10343,10 +10303,71 @@
         </p:sp>
         <p:sp>
           <p:nvSpPr>
-            <p:cNvPr id="16" name="Arrow: Right 15">
+            <p:cNvPr id="21" name="Arrow: Bent 20">
               <a:extLst>
                 <a:ext uri="{FF2B5EF4-FFF2-40B4-BE49-F238E27FC236}">
-                  <a16:creationId xmlns:a16="http://schemas.microsoft.com/office/drawing/2014/main" id="{AF758622-C63D-CF40-CCC0-B7775A2DF4B2}"/>
+                  <a16:creationId xmlns:a16="http://schemas.microsoft.com/office/drawing/2014/main" id="{59AED196-104D-15AD-EEA0-10DF60D212FA}"/>
+                </a:ext>
+              </a:extLst>
+            </p:cNvPr>
+            <p:cNvSpPr/>
+            <p:nvPr/>
+          </p:nvSpPr>
+          <p:spPr>
+            <a:xfrm flipV="1">
+              <a:off x="6617970" y="4754880"/>
+              <a:ext cx="754380" cy="720090"/>
+            </a:xfrm>
+            <a:prstGeom prst="bentArrow">
+              <a:avLst>
+                <a:gd name="adj1" fmla="val 25000"/>
+                <a:gd name="adj2" fmla="val 23190"/>
+                <a:gd name="adj3" fmla="val 25000"/>
+                <a:gd name="adj4" fmla="val 43750"/>
+              </a:avLst>
+            </a:prstGeom>
+            <a:solidFill>
+              <a:srgbClr val="FFA43D"/>
+            </a:solidFill>
+            <a:ln>
+              <a:noFill/>
+            </a:ln>
+          </p:spPr>
+          <p:style>
+            <a:lnRef idx="2">
+              <a:schemeClr val="accent1">
+                <a:shade val="15000"/>
+              </a:schemeClr>
+            </a:lnRef>
+            <a:fillRef idx="1">
+              <a:schemeClr val="accent1"/>
+            </a:fillRef>
+            <a:effectRef idx="0">
+              <a:schemeClr val="accent1"/>
+            </a:effectRef>
+            <a:fontRef idx="minor">
+              <a:schemeClr val="lt1"/>
+            </a:fontRef>
+          </p:style>
+          <p:txBody>
+            <a:bodyPr rtlCol="0" anchor="ctr"/>
+            <a:lstStyle/>
+            <a:p>
+              <a:pPr algn="ctr"/>
+              <a:endParaRPr lang="en-GB">
+                <a:solidFill>
+                  <a:schemeClr val="tx1"/>
+                </a:solidFill>
+              </a:endParaRPr>
+            </a:p>
+          </p:txBody>
+        </p:sp>
+        <p:sp>
+          <p:nvSpPr>
+            <p:cNvPr id="22" name="Arrow: Right 21">
+              <a:extLst>
+                <a:ext uri="{FF2B5EF4-FFF2-40B4-BE49-F238E27FC236}">
+                  <a16:creationId xmlns:a16="http://schemas.microsoft.com/office/drawing/2014/main" id="{41336F1F-5348-B020-7BC4-D8B214466D5D}"/>
                 </a:ext>
               </a:extLst>
             </p:cNvPr>
@@ -10355,7 +10376,7 @@
           </p:nvSpPr>
           <p:spPr>
             <a:xfrm>
-              <a:off x="6973155" y="5359421"/>
+              <a:off x="7052310" y="5595032"/>
               <a:ext cx="288000" cy="252000"/>
             </a:xfrm>
             <a:prstGeom prst="rightArrow">

</xml_diff>